<commit_message>
update aspnetcore lab 09 for EF 3
</commit_message>
<xml_diff>
--- a/aspnetcore/slides/06_apis.pptx
+++ b/aspnetcore/slides/06_apis.pptx
@@ -293,7 +293,7 @@
               <a:pPr>
                 <a:defRPr/>
               </a:pPr>
-              <a:t>10/22/2018</a:t>
+              <a:t>9/5/2019</a:t>
             </a:fld>
             <a:endParaRPr lang="en-US"/>
           </a:p>
@@ -2874,8 +2874,68 @@
         </p:blipFill>
         <p:spPr>
           <a:xfrm>
-            <a:off x="990600" y="2438400"/>
-            <a:ext cx="5907189" cy="3811797"/>
+            <a:off x="3631302" y="4038600"/>
+            <a:ext cx="4014995" cy="2590800"/>
+          </a:xfrm>
+          <a:prstGeom prst="rect">
+            <a:avLst/>
+          </a:prstGeom>
+        </p:spPr>
+      </p:pic>
+      <p:pic>
+        <p:nvPicPr>
+          <p:cNvPr id="6" name="Picture 5">
+            <a:extLst>
+              <a:ext uri="{FF2B5EF4-FFF2-40B4-BE49-F238E27FC236}">
+                <a16:creationId xmlns:a16="http://schemas.microsoft.com/office/drawing/2014/main" id="{3DCAF797-7ACF-4946-AD9C-6D33A9B4CE54}"/>
+              </a:ext>
+            </a:extLst>
+          </p:cNvPr>
+          <p:cNvPicPr>
+            <a:picLocks noChangeAspect="1"/>
+          </p:cNvPicPr>
+          <p:nvPr/>
+        </p:nvPicPr>
+        <p:blipFill>
+          <a:blip r:embed="rId3"/>
+          <a:stretch>
+            <a:fillRect/>
+          </a:stretch>
+        </p:blipFill>
+        <p:spPr>
+          <a:xfrm>
+            <a:off x="685800" y="2362200"/>
+            <a:ext cx="5410200" cy="586811"/>
+          </a:xfrm>
+          <a:prstGeom prst="rect">
+            <a:avLst/>
+          </a:prstGeom>
+        </p:spPr>
+      </p:pic>
+      <p:pic>
+        <p:nvPicPr>
+          <p:cNvPr id="7" name="Picture 6">
+            <a:extLst>
+              <a:ext uri="{FF2B5EF4-FFF2-40B4-BE49-F238E27FC236}">
+                <a16:creationId xmlns:a16="http://schemas.microsoft.com/office/drawing/2014/main" id="{231742A9-703A-4563-86F1-694F177F649A}"/>
+              </a:ext>
+            </a:extLst>
+          </p:cNvPr>
+          <p:cNvPicPr>
+            <a:picLocks noChangeAspect="1"/>
+          </p:cNvPicPr>
+          <p:nvPr/>
+        </p:nvPicPr>
+        <p:blipFill>
+          <a:blip r:embed="rId4"/>
+          <a:stretch>
+            <a:fillRect/>
+          </a:stretch>
+        </p:blipFill>
+        <p:spPr>
+          <a:xfrm>
+            <a:off x="685800" y="3200400"/>
+            <a:ext cx="4953000" cy="774167"/>
           </a:xfrm>
           <a:prstGeom prst="rect">
             <a:avLst/>

</xml_diff>